<commit_message>
added updtaed presentation file
</commit_message>
<xml_diff>
--- a/challenges/common/presentations/gaad-hackathon-playback-template.pptx
+++ b/challenges/common/presentations/gaad-hackathon-playback-template.pptx
@@ -7305,8 +7305,8 @@
               <a:buChar char="Ø"/>
             </a:pPr>
             <a:r>
-              <a:rPr lang="en" dirty="0"/>
-              <a:t>Enble content generators/creators to quickly reach a wider audience .</a:t>
+              <a:rPr lang="en-US" dirty="0"/>
+              <a:t>solving accessibility issues with Markdown pages, users can create and share documents in a way that is more inclusive and user-friendly, reaching a broader audience </a:t>
             </a:r>
           </a:p>
           <a:p>
@@ -7320,6 +7320,10 @@
               <a:buFont typeface="Wingdings" panose="05000000000000000000" pitchFamily="2" charset="2"/>
               <a:buChar char="Ø"/>
             </a:pPr>
+            <a:r>
+              <a:rPr lang="en-US" dirty="0"/>
+              <a:t>By using Theme Builder's accessibility-compatible themes for Markdown pages, users can ensure that their documents are fully accessible to all, regardless of their abilities</a:t>
+            </a:r>
             <a:endParaRPr lang="en" dirty="0"/>
           </a:p>
           <a:p>
@@ -7349,35 +7353,10 @@
               <a:buFont typeface="Wingdings" panose="05000000000000000000" pitchFamily="2" charset="2"/>
               <a:buChar char="Ø"/>
             </a:pPr>
-            <a:endParaRPr lang="en" dirty="0"/>
-          </a:p>
-          <a:p>
-            <a:pPr marL="285750" lvl="0" indent="-285750" algn="l" rtl="0">
-              <a:spcBef>
-                <a:spcPts val="0"/>
-              </a:spcBef>
-              <a:spcAft>
-                <a:spcPts val="800"/>
-              </a:spcAft>
-              <a:buFont typeface="Wingdings" panose="05000000000000000000" pitchFamily="2" charset="2"/>
-              <a:buChar char="Ø"/>
-            </a:pPr>
             <a:r>
               <a:rPr lang="en" dirty="0"/>
               <a:t>Improve inclusion</a:t>
             </a:r>
-          </a:p>
-          <a:p>
-            <a:pPr marL="0" lvl="0" indent="0" algn="l" rtl="0">
-              <a:spcBef>
-                <a:spcPts val="0"/>
-              </a:spcBef>
-              <a:spcAft>
-                <a:spcPts val="800"/>
-              </a:spcAft>
-              <a:buNone/>
-            </a:pPr>
-            <a:endParaRPr lang="en" dirty="0"/>
           </a:p>
           <a:p>
             <a:pPr marL="285750" lvl="0" indent="-285750" algn="l" rtl="0">
@@ -7432,8 +7411,8 @@
         </p:blipFill>
         <p:spPr>
           <a:xfrm>
-            <a:off x="6125231" y="1781735"/>
-            <a:ext cx="2764361" cy="1164537"/>
+            <a:off x="6539426" y="2820203"/>
+            <a:ext cx="2404549" cy="1012960"/>
           </a:xfrm>
           <a:prstGeom prst="rect">
             <a:avLst/>
@@ -7557,6 +7536,26 @@
               <a:rPr lang="en-US" dirty="0"/>
               <a:t> Making daily content work accessible and become well-versed in digital accessibility standards.</a:t>
             </a:r>
+          </a:p>
+          <a:p>
+            <a:pPr marL="285750" indent="-285750">
+              <a:buFont typeface="Wingdings" panose="05000000000000000000" pitchFamily="2" charset="2"/>
+              <a:buChar char="Ø"/>
+            </a:pPr>
+            <a:endParaRPr lang="en-US" dirty="0"/>
+          </a:p>
+          <a:p>
+            <a:pPr marL="0" indent="0">
+              <a:buNone/>
+            </a:pPr>
+            <a:endParaRPr lang="en-US" dirty="0"/>
+          </a:p>
+          <a:p>
+            <a:pPr marL="285750" indent="-285750">
+              <a:buFont typeface="Wingdings" panose="05000000000000000000" pitchFamily="2" charset="2"/>
+              <a:buChar char="Ø"/>
+            </a:pPr>
+            <a:endParaRPr lang="en-US" dirty="0"/>
           </a:p>
           <a:p>
             <a:pPr marL="0" indent="0">
@@ -7809,7 +7808,7 @@
         </p:blipFill>
         <p:spPr>
           <a:xfrm>
-            <a:off x="0" y="293442"/>
+            <a:off x="135731" y="171999"/>
             <a:ext cx="9144000" cy="4356591"/>
           </a:xfrm>
           <a:prstGeom prst="rect">
@@ -8375,7 +8374,7 @@
             </a:pPr>
             <a:r>
               <a:rPr lang="en-US" dirty="0"/>
-              <a:t>Hackathon submissions docs generated using Theme builders.</a:t>
+              <a:t>Generated themes can be applied across many documentation platforms and tools.</a:t>
             </a:r>
           </a:p>
           <a:p>
@@ -8391,8 +8390,33 @@
             </a:pPr>
             <a:r>
               <a:rPr lang="en-US" dirty="0"/>
-              <a:t>Generated themes can be applied across many documentation platforms and tools.</a:t>
+              <a:t>Solution verify documents accessibility compliance .</a:t>
             </a:r>
+          </a:p>
+          <a:p>
+            <a:pPr marL="285750" lvl="0" indent="-285750" algn="l" rtl="0">
+              <a:spcBef>
+                <a:spcPts val="800"/>
+              </a:spcBef>
+              <a:spcAft>
+                <a:spcPts val="0"/>
+              </a:spcAft>
+              <a:buFont typeface="Wingdings" panose="05000000000000000000" pitchFamily="2" charset="2"/>
+              <a:buChar char="Ø"/>
+            </a:pPr>
+            <a:endParaRPr lang="en-US" dirty="0"/>
+          </a:p>
+          <a:p>
+            <a:pPr marL="0" lvl="0" indent="0" algn="l" rtl="0">
+              <a:spcBef>
+                <a:spcPts val="800"/>
+              </a:spcBef>
+              <a:spcAft>
+                <a:spcPts val="0"/>
+              </a:spcAft>
+              <a:buNone/>
+            </a:pPr>
+            <a:endParaRPr lang="en-US" dirty="0"/>
           </a:p>
           <a:p>
             <a:pPr marL="285750" lvl="0" indent="-285750" algn="l" rtl="0">

</xml_diff>